<commit_message>
added missing files of last week
</commit_message>
<xml_diff>
--- a/Week14-Dec-08-FinlaProject/FinalPresentation.pptx
+++ b/Week14-Dec-08-FinlaProject/FinalPresentation.pptx
@@ -115,6 +115,11 @@
       </a:defRPr>
     </a:lvl9pPr>
   </p:defaultTextStyle>
+  <p:extLst>
+    <p:ext uri="{EFAFB233-063F-42B5-8137-9DF3F51BA10A}">
+      <p15:sldGuideLst xmlns:p15="http://schemas.microsoft.com/office/powerpoint/2012/main"/>
+    </p:ext>
+  </p:extLst>
 </p:presentation>
 </file>
 
@@ -265,7 +270,7 @@
           <a:p>
             <a:fld id="{0ECC16C2-A69A-0548-BFCD-30D26583AE60}" type="datetimeFigureOut">
               <a:rPr lang="en-US" smtClean="0"/>
-              <a:t>12/8/25</a:t>
+              <a:t>12/12/25</a:t>
             </a:fld>
             <a:endParaRPr lang="en-US"/>
           </a:p>
@@ -463,7 +468,7 @@
           <a:p>
             <a:fld id="{0ECC16C2-A69A-0548-BFCD-30D26583AE60}" type="datetimeFigureOut">
               <a:rPr lang="en-US" smtClean="0"/>
-              <a:t>12/8/25</a:t>
+              <a:t>12/12/25</a:t>
             </a:fld>
             <a:endParaRPr lang="en-US"/>
           </a:p>
@@ -671,7 +676,7 @@
           <a:p>
             <a:fld id="{0ECC16C2-A69A-0548-BFCD-30D26583AE60}" type="datetimeFigureOut">
               <a:rPr lang="en-US" smtClean="0"/>
-              <a:t>12/8/25</a:t>
+              <a:t>12/12/25</a:t>
             </a:fld>
             <a:endParaRPr lang="en-US"/>
           </a:p>
@@ -869,7 +874,7 @@
           <a:p>
             <a:fld id="{0ECC16C2-A69A-0548-BFCD-30D26583AE60}" type="datetimeFigureOut">
               <a:rPr lang="en-US" smtClean="0"/>
-              <a:t>12/8/25</a:t>
+              <a:t>12/12/25</a:t>
             </a:fld>
             <a:endParaRPr lang="en-US"/>
           </a:p>
@@ -1144,7 +1149,7 @@
           <a:p>
             <a:fld id="{0ECC16C2-A69A-0548-BFCD-30D26583AE60}" type="datetimeFigureOut">
               <a:rPr lang="en-US" smtClean="0"/>
-              <a:t>12/8/25</a:t>
+              <a:t>12/12/25</a:t>
             </a:fld>
             <a:endParaRPr lang="en-US"/>
           </a:p>
@@ -1409,7 +1414,7 @@
           <a:p>
             <a:fld id="{0ECC16C2-A69A-0548-BFCD-30D26583AE60}" type="datetimeFigureOut">
               <a:rPr lang="en-US" smtClean="0"/>
-              <a:t>12/8/25</a:t>
+              <a:t>12/12/25</a:t>
             </a:fld>
             <a:endParaRPr lang="en-US"/>
           </a:p>
@@ -1821,7 +1826,7 @@
           <a:p>
             <a:fld id="{0ECC16C2-A69A-0548-BFCD-30D26583AE60}" type="datetimeFigureOut">
               <a:rPr lang="en-US" smtClean="0"/>
-              <a:t>12/8/25</a:t>
+              <a:t>12/12/25</a:t>
             </a:fld>
             <a:endParaRPr lang="en-US"/>
           </a:p>
@@ -1962,7 +1967,7 @@
           <a:p>
             <a:fld id="{0ECC16C2-A69A-0548-BFCD-30D26583AE60}" type="datetimeFigureOut">
               <a:rPr lang="en-US" smtClean="0"/>
-              <a:t>12/8/25</a:t>
+              <a:t>12/12/25</a:t>
             </a:fld>
             <a:endParaRPr lang="en-US"/>
           </a:p>
@@ -2075,7 +2080,7 @@
           <a:p>
             <a:fld id="{0ECC16C2-A69A-0548-BFCD-30D26583AE60}" type="datetimeFigureOut">
               <a:rPr lang="en-US" smtClean="0"/>
-              <a:t>12/8/25</a:t>
+              <a:t>12/12/25</a:t>
             </a:fld>
             <a:endParaRPr lang="en-US"/>
           </a:p>
@@ -2386,7 +2391,7 @@
           <a:p>
             <a:fld id="{0ECC16C2-A69A-0548-BFCD-30D26583AE60}" type="datetimeFigureOut">
               <a:rPr lang="en-US" smtClean="0"/>
-              <a:t>12/8/25</a:t>
+              <a:t>12/12/25</a:t>
             </a:fld>
             <a:endParaRPr lang="en-US"/>
           </a:p>
@@ -2674,7 +2679,7 @@
           <a:p>
             <a:fld id="{0ECC16C2-A69A-0548-BFCD-30D26583AE60}" type="datetimeFigureOut">
               <a:rPr lang="en-US" smtClean="0"/>
-              <a:t>12/8/25</a:t>
+              <a:t>12/12/25</a:t>
             </a:fld>
             <a:endParaRPr lang="en-US"/>
           </a:p>
@@ -2915,7 +2920,7 @@
           <a:p>
             <a:fld id="{0ECC16C2-A69A-0548-BFCD-30D26583AE60}" type="datetimeFigureOut">
               <a:rPr lang="en-US" smtClean="0"/>
-              <a:t>12/8/25</a:t>
+              <a:t>12/12/25</a:t>
             </a:fld>
             <a:endParaRPr lang="en-US"/>
           </a:p>
@@ -9481,46 +9486,22 @@
         </p:nvSpPr>
         <p:spPr>
           <a:xfrm>
-            <a:off x="6096000" y="1971412"/>
-            <a:ext cx="5388513" cy="4513277"/>
+            <a:off x="6059054" y="1716256"/>
+            <a:ext cx="5425459" cy="4768434"/>
           </a:xfrm>
         </p:spPr>
         <p:txBody>
           <a:bodyPr anchor="t">
-            <a:normAutofit fontScale="92500" lnSpcReduction="10000"/>
+            <a:normAutofit fontScale="85000" lnSpcReduction="10000"/>
           </a:bodyPr>
           <a:lstStyle/>
           <a:p>
             <a:r>
               <a:rPr lang="en-US" sz="1400" dirty="0"/>
-              <a:t>In this step, the project uses </a:t>
-            </a:r>
-            <a:r>
-              <a:rPr lang="en-US" sz="1400" b="1" dirty="0"/>
-              <a:t>probabilistic reasoning</a:t>
-            </a:r>
-            <a:r>
-              <a:rPr lang="en-US" sz="1400" dirty="0"/>
-              <a:t> to select semifinalists and predict their likely performances. Starting from </a:t>
-            </a:r>
-            <a:r>
-              <a:rPr lang="en-US" sz="1400" i="1" dirty="0"/>
-              <a:t>prelim32.csv</a:t>
-            </a:r>
-            <a:r>
-              <a:rPr lang="en-US" sz="1400" dirty="0"/>
-              <a:t>, the code first renames and cleans the seed and prelim time columns, then computes a </a:t>
-            </a:r>
-            <a:r>
-              <a:rPr lang="en-US" sz="1400" b="1" dirty="0"/>
-              <a:t>Bayesian posterior</a:t>
-            </a:r>
-            <a:r>
-              <a:rPr lang="en-US" sz="1400" dirty="0"/>
-              <a:t> performance estimate for each athlete by combining their seed time and prelim time with prior assumptions about sprint ability. This posterior mean and standard deviation (</a:t>
-            </a:r>
-            <a:r>
-              <a:rPr lang="en-US" sz="1400" i="1" dirty="0" err="1"/>
+              <a:t>At this point, the project employs a combination of Bayesian updating and probabilistic reasoning to choose the finalists and make predictions about the race outcomes. The preliminary data in prelim32.csv is used as the starting point, and the first thing that happens in the code is cleaning and standardizing the two columns: seed and preliminary time. Following the Bayesian inference method (Chapter 13), the posterior mean and standard deviation for each athlete's hidden skill (</a:t>
+            </a:r>
+            <a:r>
+              <a:rPr lang="en-US" sz="1400" dirty="0" err="1"/>
               <a:t>PostMean</a:t>
             </a:r>
             <a:r>
@@ -9528,36 +9509,32 @@
               <a:t>, </a:t>
             </a:r>
             <a:r>
-              <a:rPr lang="en-US" sz="1400" i="1" dirty="0" err="1"/>
+              <a:rPr lang="en-US" sz="1400" dirty="0" err="1"/>
               <a:t>PostStd</a:t>
             </a:r>
             <a:r>
               <a:rPr lang="en-US" sz="1400" dirty="0"/>
-              <a:t>) summarize what we now believe about each athlete’s true speed after seeing both pieces of evidence. The 16 best athletes by </a:t>
+              <a:t>) are derived by integrating the athlete's seed time and prelim time with prior knowledge about the performance in the sprint category. The posterior parameters serve as a compact and collective representation of the adjusted conviction regarding the individual capability of each athlete to run fast after viewing both pieces of evidence.</a:t>
+            </a:r>
+          </a:p>
+          <a:p>
+            <a:r>
+              <a:rPr lang="en-US" sz="1400" dirty="0"/>
+              <a:t>The 16 athletes with the highest posterior means are deterministically chosen as semifinalists, then seeded 1–16 and separated into two heats, with lanes distributed according to the usual preferred lane order (4, 5, 3, 6, 2, 7, 1, 8). In order to simulate the uncertainty on the day of the event and the results of the race, the script makes use of probabilistic reasoning (Chapter 14) by conducting 20,000 Monte Carlo simulations of the semifinal round. During each simulation, race times are drawn from the predictive distribution of the posterior for each athlete, and progression is decided based on the finishing order within the respective heat.</a:t>
+            </a:r>
+          </a:p>
+          <a:p>
+            <a:r>
+              <a:rPr lang="en-US" sz="1400" dirty="0"/>
+              <a:t>The code, from these simulations, calculates the probability of each athlete's advancement (</a:t>
             </a:r>
             <a:r>
               <a:rPr lang="en-US" sz="1400" dirty="0" err="1"/>
-              <a:t>PostMean</a:t>
+              <a:t>AdvanceProb</a:t>
             </a:r>
             <a:r>
               <a:rPr lang="en-US" sz="1400" dirty="0"/>
-              <a:t> are selected as semifinalists, seeded 1–16, and split into two heats with lanes assigned according to a standard preferred lane order (4, 5, 3, 6, 2, 7, 1, 8). To capture uncertainty, the script then runs </a:t>
-            </a:r>
-            <a:r>
-              <a:rPr lang="en-US" sz="1400" b="1" dirty="0"/>
-              <a:t>20,000 Monte Carlo simulations</a:t>
-            </a:r>
-            <a:r>
-              <a:rPr lang="en-US" sz="1400" dirty="0"/>
-              <a:t> of the semifinal round, sampling times from each athlete’s posterior predictive distribution. From these simulations it estimates each athlete’s probability of advancing (</a:t>
-            </a:r>
-            <a:r>
-              <a:rPr lang="en-US" sz="1400" i="1" dirty="0" err="1"/>
-              <a:t>AdvanceProb</a:t>
-            </a:r>
-            <a:r>
-              <a:rPr lang="en-US" sz="1400" dirty="0"/>
-              <a:t>) and summarizes their time distribution with mean, median, best-case, worst-case, and one representative “</a:t>
+              <a:t>) and presents the summary of the posterior predictive distribution of semifinal times using the mean, median, best-case, worst-case, and a representative "</a:t>
             </a:r>
             <a:r>
               <a:rPr lang="en-US" sz="1400" dirty="0" err="1"/>
@@ -9565,31 +9542,7 @@
             </a:r>
             <a:r>
               <a:rPr lang="en-US" sz="1400" dirty="0"/>
-              <a:t>” that looks like a realistic race performance. These enriched results are saved as </a:t>
-            </a:r>
-            <a:r>
-              <a:rPr lang="en-US" sz="1400" i="1" dirty="0"/>
-              <a:t>Semifinals_CH13_CH14.csv</a:t>
-            </a:r>
-            <a:r>
-              <a:rPr lang="en-US" sz="1400" dirty="0"/>
-              <a:t>. Finally, for finalist selection, the code takes the top four athletes per heat by probability of advancing, re-ranks them by their displayed semifinal performance, assigns final lanes using the same preferred lane pattern, and exports </a:t>
-            </a:r>
-            <a:r>
-              <a:rPr lang="en-US" sz="1400" i="1" dirty="0"/>
-              <a:t>Finalists_CH13_CH14.csv</a:t>
-            </a:r>
-            <a:r>
-              <a:rPr lang="en-US" sz="1400" dirty="0"/>
-              <a:t>. Overall, this step transforms deterministic qualification into a </a:t>
-            </a:r>
-            <a:r>
-              <a:rPr lang="en-US" sz="1400" b="1" dirty="0"/>
-              <a:t>probability-aware process</a:t>
-            </a:r>
-            <a:r>
-              <a:rPr lang="en-US" sz="1400" dirty="0"/>
-              <a:t> that acknowledges performance variability and uses simulation to make more informed, data-driven advancement decisions.</a:t>
+              <a:t>" which is similar to a realistic race outcome. These findings are documented in Semifinals_CH13_CH14.csv. The four athletes with the highest probability of advancing per heat are then selected as finalists, re-ordered based on their displayed semifinal performance, assigned final lanes following the same preferred lane pattern, and exported to Finalists_CH13_CH14.csv.</a:t>
             </a:r>
             <a:endParaRPr lang="en-US" sz="2000" dirty="0">
               <a:solidFill>

</xml_diff>